<commit_message>
Fri, Dec 15, 2017  1:07:31 PM
</commit_message>
<xml_diff>
--- a/ppt/CreateYourOwnApp.pptx
+++ b/ppt/CreateYourOwnApp.pptx
@@ -5,7 +5,7 @@
     <p:sldMasterId id="2147483659" r:id="rId1"/>
   </p:sldMasterIdLst>
   <p:notesMasterIdLst>
-    <p:notesMasterId r:id="rId22"/>
+    <p:notesMasterId r:id="rId23"/>
   </p:notesMasterIdLst>
   <p:sldIdLst>
     <p:sldId id="256" r:id="rId2"/>
@@ -28,18 +28,19 @@
     <p:sldId id="277" r:id="rId19"/>
     <p:sldId id="278" r:id="rId20"/>
     <p:sldId id="279" r:id="rId21"/>
+    <p:sldId id="280" r:id="rId22"/>
   </p:sldIdLst>
   <p:sldSz cx="9144000" cy="5143500" type="screen16x9"/>
   <p:notesSz cx="6858000" cy="9144000"/>
   <p:embeddedFontLst>
     <p:embeddedFont>
-      <p:font typeface="Source Code Pro" panose="020B0604020202020204" charset="0"/>
-      <p:regular r:id="rId23"/>
+      <p:font typeface="Amatic SC" panose="020B0604020202020204" charset="-79"/>
       <p:bold r:id="rId24"/>
     </p:embeddedFont>
     <p:embeddedFont>
-      <p:font typeface="Amatic SC" panose="020B0604020202020204" charset="-79"/>
-      <p:bold r:id="rId25"/>
+      <p:font typeface="Source Code Pro" panose="020B0604020202020204" charset="0"/>
+      <p:regular r:id="rId25"/>
+      <p:bold r:id="rId26"/>
     </p:embeddedFont>
   </p:embeddedFontLst>
   <p:defaultTextStyle>
@@ -1437,6 +1438,107 @@
 </file>
 
 <file path=ppt/notesSlides/notesSlide18.xml><?xml version="1.0" encoding="utf-8"?>
+<p:notes xmlns:a="http://schemas.openxmlformats.org/drawingml/2006/main" xmlns:r="http://schemas.openxmlformats.org/officeDocument/2006/relationships" xmlns:p="http://schemas.openxmlformats.org/presentationml/2006/main" showMasterSp="0" showMasterPhAnim="0">
+  <p:cSld>
+    <p:spTree>
+      <p:nvGrpSpPr>
+        <p:cNvPr id="1" name="Shape 64"/>
+        <p:cNvGrpSpPr/>
+        <p:nvPr/>
+      </p:nvGrpSpPr>
+      <p:grpSpPr>
+        <a:xfrm>
+          <a:off x="0" y="0"/>
+          <a:ext cx="0" cy="0"/>
+          <a:chOff x="0" y="0"/>
+          <a:chExt cx="0" cy="0"/>
+        </a:xfrm>
+      </p:grpSpPr>
+      <p:sp>
+        <p:nvSpPr>
+          <p:cNvPr id="65" name="Shape 65"/>
+          <p:cNvSpPr>
+            <a:spLocks noGrp="1" noRot="1" noChangeAspect="1"/>
+          </p:cNvSpPr>
+          <p:nvPr>
+            <p:ph type="sldImg" idx="2"/>
+          </p:nvPr>
+        </p:nvSpPr>
+        <p:spPr>
+          <a:xfrm>
+            <a:off x="381000" y="685800"/>
+            <a:ext cx="6096000" cy="3429000"/>
+          </a:xfrm>
+          <a:custGeom>
+            <a:avLst/>
+            <a:gdLst/>
+            <a:ahLst/>
+            <a:cxnLst/>
+            <a:rect l="0" t="0" r="0" b="0"/>
+            <a:pathLst>
+              <a:path w="120000" h="120000" extrusionOk="0">
+                <a:moveTo>
+                  <a:pt x="0" y="0"/>
+                </a:moveTo>
+                <a:lnTo>
+                  <a:pt x="120000" y="0"/>
+                </a:lnTo>
+                <a:lnTo>
+                  <a:pt x="120000" y="120000"/>
+                </a:lnTo>
+                <a:lnTo>
+                  <a:pt x="0" y="120000"/>
+                </a:lnTo>
+                <a:close/>
+              </a:path>
+            </a:pathLst>
+          </a:custGeom>
+        </p:spPr>
+      </p:sp>
+      <p:sp>
+        <p:nvSpPr>
+          <p:cNvPr id="66" name="Shape 66"/>
+          <p:cNvSpPr txBox="1">
+            <a:spLocks noGrp="1"/>
+          </p:cNvSpPr>
+          <p:nvPr>
+            <p:ph type="body" idx="1"/>
+          </p:nvPr>
+        </p:nvSpPr>
+        <p:spPr>
+          <a:xfrm>
+            <a:off x="685800" y="4343400"/>
+            <a:ext cx="5486400" cy="4114800"/>
+          </a:xfrm>
+          <a:prstGeom prst="rect">
+            <a:avLst/>
+          </a:prstGeom>
+        </p:spPr>
+        <p:txBody>
+          <a:bodyPr wrap="square" lIns="91425" tIns="91425" rIns="91425" bIns="91425" anchor="t" anchorCtr="0">
+            <a:noAutofit/>
+          </a:bodyPr>
+          <a:lstStyle/>
+          <a:p>
+            <a:pPr marL="0" lvl="0" indent="0">
+              <a:spcBef>
+                <a:spcPts val="0"/>
+              </a:spcBef>
+              <a:buNone/>
+            </a:pPr>
+            <a:endParaRPr/>
+          </a:p>
+        </p:txBody>
+      </p:sp>
+    </p:spTree>
+  </p:cSld>
+  <p:clrMapOvr>
+    <a:masterClrMapping/>
+  </p:clrMapOvr>
+</p:notes>
+</file>
+
+<file path=ppt/notesSlides/notesSlide19.xml><?xml version="1.0" encoding="utf-8"?>
 <p:notes xmlns:a="http://schemas.openxmlformats.org/drawingml/2006/main" xmlns:r="http://schemas.openxmlformats.org/officeDocument/2006/relationships" xmlns:p="http://schemas.openxmlformats.org/presentationml/2006/main" showMasterSp="0" showMasterPhAnim="0">
   <p:cSld>
     <p:spTree>
@@ -5522,8 +5624,8 @@
         </p:nvSpPr>
         <p:spPr>
           <a:xfrm>
-            <a:off x="311700" y="3890400"/>
-            <a:ext cx="8520600" cy="706200"/>
+            <a:off x="304800" y="3790950"/>
+            <a:ext cx="8520600" cy="1066800"/>
           </a:xfrm>
           <a:prstGeom prst="rect">
             <a:avLst/>
@@ -5543,7 +5645,34 @@
             </a:pPr>
             <a:r>
               <a:rPr lang="en" dirty="0" smtClean="0"/>
-              <a:t>Exlore Qt C++/WPF by creating your own App </a:t>
+              <a:t>Exlore Qt C++/WPF by creating your own </a:t>
+            </a:r>
+            <a:r>
+              <a:rPr lang="en" dirty="0" smtClean="0"/>
+              <a:t>App</a:t>
+            </a:r>
+          </a:p>
+          <a:p>
+            <a:pPr lvl="0"/>
+            <a:r>
+              <a:rPr lang="en-US" dirty="0">
+                <a:hlinkClick r:id="rId3"/>
+              </a:rPr>
+              <a:t>https://</a:t>
+            </a:r>
+            <a:r>
+              <a:rPr lang="en-US" dirty="0" smtClean="0">
+                <a:hlinkClick r:id="rId3"/>
+              </a:rPr>
+              <a:t>github.com/natashaiwscope/emulator_v0</a:t>
+            </a:r>
+            <a:endParaRPr lang="en-US" dirty="0" smtClean="0"/>
+          </a:p>
+          <a:p>
+            <a:pPr lvl="0"/>
+            <a:r>
+              <a:rPr lang="en" dirty="0" smtClean="0"/>
+              <a:t> </a:t>
             </a:r>
             <a:endParaRPr lang="en" dirty="0"/>
           </a:p>
@@ -5621,15 +5750,7 @@
             </a:br>
             <a:r>
               <a:rPr lang="en" dirty="0" smtClean="0"/>
-              <a:t>JUST A Message </a:t>
-            </a:r>
-            <a:r>
-              <a:rPr lang="en" dirty="0" smtClean="0"/>
-              <a:t>post will </a:t>
-            </a:r>
-            <a:r>
-              <a:rPr lang="en" dirty="0" smtClean="0"/>
-              <a:t>let you know asyncronous if data available</a:t>
+              <a:t>JUST A Message post will let you know asyncronous if data available</a:t>
             </a:r>
             <a:endParaRPr lang="en" dirty="0"/>
           </a:p>
@@ -9705,6 +9826,99 @@
     <p:extLst>
       <p:ext uri="{BB962C8B-B14F-4D97-AF65-F5344CB8AC3E}">
         <p14:creationId xmlns:p14="http://schemas.microsoft.com/office/powerpoint/2010/main" val="743719011"/>
+      </p:ext>
+    </p:extLst>
+  </p:cSld>
+  <p:clrMapOvr>
+    <a:masterClrMapping/>
+  </p:clrMapOvr>
+</p:sld>
+</file>
+
+<file path=ppt/slides/slide21.xml><?xml version="1.0" encoding="utf-8"?>
+<p:sld xmlns:a="http://schemas.openxmlformats.org/drawingml/2006/main" xmlns:r="http://schemas.openxmlformats.org/officeDocument/2006/relationships" xmlns:p="http://schemas.openxmlformats.org/presentationml/2006/main">
+  <p:cSld>
+    <p:spTree>
+      <p:nvGrpSpPr>
+        <p:cNvPr id="1" name="Shape 67"/>
+        <p:cNvGrpSpPr/>
+        <p:nvPr/>
+      </p:nvGrpSpPr>
+      <p:grpSpPr>
+        <a:xfrm>
+          <a:off x="0" y="0"/>
+          <a:ext cx="0" cy="0"/>
+          <a:chOff x="0" y="0"/>
+          <a:chExt cx="0" cy="0"/>
+        </a:xfrm>
+      </p:grpSpPr>
+      <p:sp>
+        <p:nvSpPr>
+          <p:cNvPr id="68" name="Shape 68"/>
+          <p:cNvSpPr txBox="1">
+            <a:spLocks noGrp="1"/>
+          </p:cNvSpPr>
+          <p:nvPr>
+            <p:ph type="title"/>
+          </p:nvPr>
+        </p:nvSpPr>
+        <p:spPr>
+          <a:xfrm>
+            <a:off x="533400" y="514350"/>
+            <a:ext cx="8077200" cy="4343400"/>
+          </a:xfrm>
+          <a:prstGeom prst="rect">
+            <a:avLst/>
+          </a:prstGeom>
+        </p:spPr>
+        <p:txBody>
+          <a:bodyPr wrap="square" lIns="91425" tIns="91425" rIns="91425" bIns="91425" anchor="ctr" anchorCtr="0">
+            <a:noAutofit/>
+          </a:bodyPr>
+          <a:lstStyle/>
+          <a:p>
+            <a:r>
+              <a:rPr lang="en" dirty="0" smtClean="0"/>
+              <a:t>All new Source code and latest documents</a:t>
+            </a:r>
+            <a:br>
+              <a:rPr lang="en" dirty="0" smtClean="0"/>
+            </a:br>
+            <a:r>
+              <a:rPr lang="en" dirty="0" smtClean="0"/>
+              <a:t>GIT Repo</a:t>
+            </a:r>
+            <a:br>
+              <a:rPr lang="en" dirty="0" smtClean="0"/>
+            </a:br>
+            <a:r>
+              <a:rPr lang="en" dirty="0" smtClean="0"/>
+              <a:t/>
+            </a:r>
+            <a:br>
+              <a:rPr lang="en" dirty="0" smtClean="0"/>
+            </a:br>
+            <a:r>
+              <a:rPr lang="en-US" sz="3200" dirty="0">
+                <a:hlinkClick r:id="rId3"/>
+              </a:rPr>
+              <a:t>https://github.com/natashaiwscope/emulator_v0</a:t>
+            </a:r>
+            <a:r>
+              <a:rPr lang="en-US" sz="2400" dirty="0"/>
+              <a:t/>
+            </a:r>
+            <a:br>
+              <a:rPr lang="en-US" sz="2400" dirty="0"/>
+            </a:br>
+            <a:endParaRPr lang="en" sz="2400" dirty="0"/>
+          </a:p>
+        </p:txBody>
+      </p:sp>
+    </p:spTree>
+    <p:extLst>
+      <p:ext uri="{BB962C8B-B14F-4D97-AF65-F5344CB8AC3E}">
+        <p14:creationId xmlns:p14="http://schemas.microsoft.com/office/powerpoint/2010/main" val="2727860382"/>
       </p:ext>
     </p:extLst>
   </p:cSld>

</xml_diff>

<commit_message>
Sun, Dec 17, 2017  9:48:02 AM
</commit_message>
<xml_diff>
--- a/ppt/CreateYourOwnApp.pptx
+++ b/ppt/CreateYourOwnApp.pptx
@@ -38,9 +38,16 @@
       <p:bold r:id="rId24"/>
     </p:embeddedFont>
     <p:embeddedFont>
-      <p:font typeface="Source Code Pro" panose="020B0604020202020204" charset="0"/>
+      <p:font typeface="Consolas" panose="020B0609020204030204" pitchFamily="49" charset="0"/>
       <p:regular r:id="rId25"/>
       <p:bold r:id="rId26"/>
+      <p:italic r:id="rId27"/>
+      <p:boldItalic r:id="rId28"/>
+    </p:embeddedFont>
+    <p:embeddedFont>
+      <p:font typeface="Source Code Pro" panose="020B0604020202020204" charset="0"/>
+      <p:regular r:id="rId29"/>
+      <p:bold r:id="rId30"/>
     </p:embeddedFont>
   </p:embeddedFontLst>
   <p:defaultTextStyle>
@@ -5645,7 +5652,11 @@
             </a:pPr>
             <a:r>
               <a:rPr lang="en" dirty="0" smtClean="0"/>
-              <a:t>Exlore Qt C++/WPF by creating your own App</a:t>
+              <a:t>Explore </a:t>
+            </a:r>
+            <a:r>
+              <a:rPr lang="en" dirty="0" smtClean="0"/>
+              <a:t>Qt C++/WPF by creating your own App</a:t>
             </a:r>
           </a:p>
           <a:p>
@@ -5732,7 +5743,15 @@
             </a:pPr>
             <a:r>
               <a:rPr lang="en" dirty="0" smtClean="0"/>
-              <a:t>You Never need to poll if data available, </a:t>
+              <a:t>You Never need to poll </a:t>
+            </a:r>
+            <a:r>
+              <a:rPr lang="en" dirty="0" smtClean="0"/>
+              <a:t>for data, </a:t>
+            </a:r>
+            <a:r>
+              <a:rPr lang="en" dirty="0" smtClean="0"/>
+              <a:t/>
             </a:r>
             <a:br>
               <a:rPr lang="en" dirty="0" smtClean="0"/>
@@ -5746,7 +5765,22 @@
             </a:br>
             <a:r>
               <a:rPr lang="en" dirty="0" smtClean="0"/>
-              <a:t>JUST A Message post will let you know asyncronous if data available</a:t>
+              <a:t>message post will inform </a:t>
+            </a:r>
+            <a:r>
+              <a:rPr lang="en" dirty="0" smtClean="0"/>
+              <a:t> </a:t>
+            </a:r>
+            <a:br>
+              <a:rPr lang="en" dirty="0" smtClean="0"/>
+            </a:br>
+            <a:r>
+              <a:rPr lang="en" dirty="0" smtClean="0"/>
+              <a:t>if </a:t>
+            </a:r>
+            <a:r>
+              <a:rPr lang="en" dirty="0" smtClean="0"/>
+              <a:t>asyncronous if data available</a:t>
             </a:r>
             <a:endParaRPr lang="en" dirty="0"/>
           </a:p>
@@ -6412,7 +6446,41 @@
             </a:pPr>
             <a:r>
               <a:rPr lang="en" dirty="0" smtClean="0"/>
-              <a:t>Now you got basic idea, please compile/build your self. </a:t>
+              <a:t>Now you got basic idea, please </a:t>
+            </a:r>
+            <a:r>
+              <a:rPr lang="en" dirty="0" smtClean="0"/>
+              <a:t>try to compile/build </a:t>
+            </a:r>
+            <a:r>
+              <a:rPr lang="en" dirty="0" smtClean="0"/>
+              <a:t>your self</a:t>
+            </a:r>
+            <a:r>
+              <a:rPr lang="en" dirty="0" smtClean="0"/>
+              <a:t>.</a:t>
+            </a:r>
+            <a:br>
+              <a:rPr lang="en" dirty="0" smtClean="0"/>
+            </a:br>
+            <a:r>
+              <a:rPr lang="en-US" dirty="0" smtClean="0"/>
+              <a:t>S</a:t>
+            </a:r>
+            <a:r>
+              <a:rPr lang="en" dirty="0" smtClean="0"/>
+              <a:t>end email for any issue</a:t>
+            </a:r>
+            <a:br>
+              <a:rPr lang="en" dirty="0" smtClean="0"/>
+            </a:br>
+            <a:r>
+              <a:rPr lang="en" dirty="0" smtClean="0"/>
+              <a:t>support@iwscope.com</a:t>
+            </a:r>
+            <a:r>
+              <a:rPr lang="en" dirty="0" smtClean="0"/>
+              <a:t> </a:t>
             </a:r>
             <a:endParaRPr lang="en" dirty="0"/>
           </a:p>
@@ -6481,7 +6549,18 @@
             </a:pPr>
             <a:r>
               <a:rPr lang="en" dirty="0" smtClean="0"/>
-              <a:t>Now WPF</a:t>
+              <a:t>Now </a:t>
+            </a:r>
+            <a:r>
+              <a:rPr lang="en" dirty="0" smtClean="0"/>
+              <a:t>microsoft WPF</a:t>
+            </a:r>
+            <a:br>
+              <a:rPr lang="en" dirty="0" smtClean="0"/>
+            </a:br>
+            <a:r>
+              <a:rPr lang="en" dirty="0" smtClean="0"/>
+              <a:t>(windows presentation foundation)</a:t>
             </a:r>
             <a:r>
               <a:rPr lang="en" dirty="0"/>
@@ -8710,8 +8789,8 @@
         </p:nvSpPr>
         <p:spPr>
           <a:xfrm>
-            <a:off x="533399" y="971550"/>
-            <a:ext cx="7390305" cy="1371600"/>
+            <a:off x="502919" y="971550"/>
+            <a:ext cx="7390305" cy="1524000"/>
           </a:xfrm>
           <a:prstGeom prst="rect">
             <a:avLst/>
@@ -8945,7 +9024,27 @@
                   </a:schemeClr>
                 </a:solidFill>
               </a:rPr>
-              <a:t>() is mandatory function which should be called, its may issue a firewall warning on windows, as it opens listening UDP socket and 5555 and 5683 (</a:t>
+              <a:t>() is mandatory function which should be called, </a:t>
+            </a:r>
+            <a:r>
+              <a:rPr lang="en-US" sz="2800" dirty="0" smtClean="0">
+                <a:solidFill>
+                  <a:schemeClr val="accent4">
+                    <a:lumMod val="75000"/>
+                  </a:schemeClr>
+                </a:solidFill>
+              </a:rPr>
+              <a:t>it </a:t>
+            </a:r>
+            <a:r>
+              <a:rPr lang="en-US" sz="2800" dirty="0" smtClean="0">
+                <a:solidFill>
+                  <a:schemeClr val="accent4">
+                    <a:lumMod val="75000"/>
+                  </a:schemeClr>
+                </a:solidFill>
+              </a:rPr>
+              <a:t>may issue a </a:t>
             </a:r>
             <a:r>
               <a:rPr lang="en-US" sz="2800" dirty="0" err="1" smtClean="0">
@@ -8955,17 +9054,17 @@
                   </a:schemeClr>
                 </a:solidFill>
               </a:rPr>
-              <a:t>CoAP</a:t>
+              <a:t>stadanrad</a:t>
             </a:r>
             <a:r>
-              <a:rPr lang="en-US" sz="2800" dirty="0">
+              <a:rPr lang="en-US" sz="2800" dirty="0" smtClean="0">
                 <a:solidFill>
                   <a:schemeClr val="accent4">
                     <a:lumMod val="75000"/>
                   </a:schemeClr>
                 </a:solidFill>
               </a:rPr>
-              <a:t> </a:t>
+              <a:t> firewall </a:t>
             </a:r>
             <a:r>
               <a:rPr lang="en-US" sz="2800" dirty="0" smtClean="0">
@@ -8975,7 +9074,37 @@
                   </a:schemeClr>
                 </a:solidFill>
               </a:rPr>
-              <a:t>port)</a:t>
+              <a:t>warning on </a:t>
+            </a:r>
+            <a:r>
+              <a:rPr lang="en-US" sz="2800" dirty="0" smtClean="0">
+                <a:solidFill>
+                  <a:schemeClr val="accent4">
+                    <a:lumMod val="75000"/>
+                  </a:schemeClr>
+                </a:solidFill>
+              </a:rPr>
+              <a:t>windows (first time), </a:t>
+            </a:r>
+            <a:r>
+              <a:rPr lang="en-US" sz="2800" dirty="0" smtClean="0">
+                <a:solidFill>
+                  <a:schemeClr val="accent4">
+                    <a:lumMod val="75000"/>
+                  </a:schemeClr>
+                </a:solidFill>
+              </a:rPr>
+              <a:t>as it opens listening UDP socket and 5555 and 5683 </a:t>
+            </a:r>
+            <a:r>
+              <a:rPr lang="en-US" sz="2800" dirty="0" smtClean="0">
+                <a:solidFill>
+                  <a:schemeClr val="accent4">
+                    <a:lumMod val="75000"/>
+                  </a:schemeClr>
+                </a:solidFill>
+              </a:rPr>
+              <a:t> </a:t>
             </a:r>
             <a:endParaRPr lang="en" sz="2800" dirty="0">
               <a:solidFill>
@@ -9428,7 +9557,11 @@
           <a:p>
             <a:r>
               <a:rPr lang="en-US" sz="3600" dirty="0" smtClean="0"/>
-              <a:t>At one time user can access single device</a:t>
+              <a:t>At one time user can access single </a:t>
+            </a:r>
+            <a:r>
+              <a:rPr lang="en-US" sz="3600" dirty="0" smtClean="0"/>
+              <a:t>device</a:t>
             </a:r>
             <a:endParaRPr lang="en" sz="3600" dirty="0"/>
           </a:p>
@@ -9445,7 +9578,7 @@
         <p:spPr>
           <a:xfrm>
             <a:off x="533399" y="971550"/>
-            <a:ext cx="3048001" cy="3657600"/>
+            <a:ext cx="3048001" cy="4038600"/>
           </a:xfrm>
           <a:prstGeom prst="rect">
             <a:avLst/>
@@ -9669,83 +9802,51 @@
                   </a:schemeClr>
                 </a:solidFill>
               </a:rPr>
-              <a:t> select individual using </a:t>
+              <a:t>User can select one Ethernet (if more then 1)</a:t>
             </a:r>
+          </a:p>
+          <a:p>
             <a:r>
-              <a:rPr lang="en-US" sz="2800" dirty="0" err="1" smtClean="0">
+              <a:rPr lang="en-US" sz="2800" dirty="0" smtClean="0">
                 <a:solidFill>
                   <a:schemeClr val="accent4">
                     <a:lumMod val="75000"/>
                   </a:schemeClr>
                 </a:solidFill>
+              </a:rPr>
+              <a:t> </a:t>
+            </a:r>
+            <a:r>
+              <a:rPr lang="en-US" sz="1800" dirty="0" smtClean="0">
+                <a:solidFill>
+                  <a:schemeClr val="accent4">
+                    <a:lumMod val="75000"/>
+                  </a:schemeClr>
+                </a:solidFill>
+              </a:rPr>
+              <a:t> using </a:t>
+            </a:r>
+            <a:r>
+              <a:rPr lang="en-US" sz="1600" dirty="0" err="1" smtClean="0">
+                <a:solidFill>
+                  <a:srgbClr val="0070C0"/>
+                </a:solidFill>
+                <a:latin typeface="Consolas" panose="020B0609020204030204" pitchFamily="49" charset="0"/>
               </a:rPr>
               <a:t>usselectdevIndex</a:t>
             </a:r>
             <a:r>
-              <a:rPr lang="en-US" sz="2800" dirty="0" smtClean="0">
-                <a:solidFill>
-                  <a:schemeClr val="accent4">
-                    <a:lumMod val="75000"/>
-                  </a:schemeClr>
-                </a:solidFill>
+              <a:rPr lang="en-US" sz="1600" dirty="0" smtClean="0">
+                <a:solidFill>
+                  <a:srgbClr val="0070C0"/>
+                </a:solidFill>
+                <a:latin typeface="Consolas" panose="020B0609020204030204" pitchFamily="49" charset="0"/>
               </a:rPr>
               <a:t>(0)</a:t>
             </a:r>
           </a:p>
           <a:p>
-            <a:r>
-              <a:rPr lang="en-US" sz="2800" dirty="0" err="1" smtClean="0">
-                <a:solidFill>
-                  <a:schemeClr val="accent4">
-                    <a:lumMod val="75000"/>
-                  </a:schemeClr>
-                </a:solidFill>
-              </a:rPr>
-              <a:t>Uart_read</a:t>
-            </a:r>
-            <a:r>
-              <a:rPr lang="en-US" sz="2800" dirty="0" smtClean="0">
-                <a:solidFill>
-                  <a:schemeClr val="accent4">
-                    <a:lumMod val="75000"/>
-                  </a:schemeClr>
-                </a:solidFill>
-              </a:rPr>
-              <a:t> or </a:t>
-            </a:r>
-            <a:r>
-              <a:rPr lang="en-US" sz="2800" dirty="0" err="1" smtClean="0">
-                <a:solidFill>
-                  <a:schemeClr val="accent4">
-                    <a:lumMod val="75000"/>
-                  </a:schemeClr>
-                </a:solidFill>
-              </a:rPr>
-              <a:t>uart_write</a:t>
-            </a:r>
-            <a:r>
-              <a:rPr lang="en-US" sz="2800" dirty="0" smtClean="0">
-                <a:solidFill>
-                  <a:schemeClr val="accent4">
-                    <a:lumMod val="75000"/>
-                  </a:schemeClr>
-                </a:solidFill>
-              </a:rPr>
-              <a:t> will work currently selected device.</a:t>
-            </a:r>
-          </a:p>
-          <a:p>
-            <a:r>
-              <a:rPr lang="en-US" sz="2800" dirty="0" smtClean="0">
-                <a:solidFill>
-                  <a:schemeClr val="accent4">
-                    <a:lumMod val="75000"/>
-                  </a:schemeClr>
-                </a:solidFill>
-              </a:rPr>
-              <a:t>At a time only single device can be selected</a:t>
-            </a:r>
-            <a:endParaRPr lang="en-US" sz="2800" dirty="0">
+            <a:endParaRPr lang="en-US" sz="1800" dirty="0" smtClean="0">
               <a:solidFill>
                 <a:schemeClr val="accent4">
                   <a:lumMod val="75000"/>
@@ -9754,7 +9855,155 @@
             </a:endParaRPr>
           </a:p>
           <a:p>
-            <a:endParaRPr lang="en" sz="2800" dirty="0">
+            <a:r>
+              <a:rPr lang="en-US" sz="1800" dirty="0" err="1" smtClean="0">
+                <a:solidFill>
+                  <a:srgbClr val="0070C0"/>
+                </a:solidFill>
+                <a:latin typeface="Consolas" panose="020B0609020204030204" pitchFamily="49" charset="0"/>
+              </a:rPr>
+              <a:t>u</a:t>
+            </a:r>
+            <a:r>
+              <a:rPr lang="en-US" sz="1800" dirty="0" err="1" smtClean="0">
+                <a:solidFill>
+                  <a:srgbClr val="0070C0"/>
+                </a:solidFill>
+                <a:latin typeface="Consolas" panose="020B0609020204030204" pitchFamily="49" charset="0"/>
+              </a:rPr>
+              <a:t>art_read</a:t>
+            </a:r>
+            <a:r>
+              <a:rPr lang="en-US" sz="1800" dirty="0" smtClean="0">
+                <a:solidFill>
+                  <a:schemeClr val="accent4">
+                    <a:lumMod val="75000"/>
+                  </a:schemeClr>
+                </a:solidFill>
+              </a:rPr>
+              <a:t> </a:t>
+            </a:r>
+            <a:r>
+              <a:rPr lang="en-US" sz="1800" dirty="0" smtClean="0">
+                <a:solidFill>
+                  <a:schemeClr val="accent4">
+                    <a:lumMod val="75000"/>
+                  </a:schemeClr>
+                </a:solidFill>
+              </a:rPr>
+              <a:t>or </a:t>
+            </a:r>
+            <a:endParaRPr lang="en-US" sz="1800" dirty="0">
+              <a:solidFill>
+                <a:schemeClr val="accent4">
+                  <a:lumMod val="75000"/>
+                </a:schemeClr>
+              </a:solidFill>
+            </a:endParaRPr>
+          </a:p>
+          <a:p>
+            <a:r>
+              <a:rPr lang="en-US" sz="1800" dirty="0" err="1" smtClean="0">
+                <a:solidFill>
+                  <a:srgbClr val="0070C0"/>
+                </a:solidFill>
+                <a:latin typeface="Consolas" panose="020B0609020204030204" pitchFamily="49" charset="0"/>
+              </a:rPr>
+              <a:t>uart_write</a:t>
+            </a:r>
+            <a:r>
+              <a:rPr lang="en-US" sz="1800" dirty="0" smtClean="0">
+                <a:solidFill>
+                  <a:schemeClr val="accent4">
+                    <a:lumMod val="75000"/>
+                  </a:schemeClr>
+                </a:solidFill>
+              </a:rPr>
+              <a:t> </a:t>
+            </a:r>
+            <a:r>
+              <a:rPr lang="en-US" sz="1800" dirty="0" smtClean="0">
+                <a:solidFill>
+                  <a:schemeClr val="accent4">
+                    <a:lumMod val="75000"/>
+                  </a:schemeClr>
+                </a:solidFill>
+              </a:rPr>
+              <a:t>will work currently selected device.</a:t>
+            </a:r>
+          </a:p>
+          <a:p>
+            <a:r>
+              <a:rPr lang="en-US" sz="1800" dirty="0" smtClean="0">
+                <a:solidFill>
+                  <a:schemeClr val="accent4">
+                    <a:lumMod val="75000"/>
+                  </a:schemeClr>
+                </a:solidFill>
+              </a:rPr>
+              <a:t>At a time only </a:t>
+            </a:r>
+            <a:r>
+              <a:rPr lang="en-US" sz="1800" dirty="0" smtClean="0">
+                <a:solidFill>
+                  <a:schemeClr val="accent4">
+                    <a:lumMod val="75000"/>
+                  </a:schemeClr>
+                </a:solidFill>
+              </a:rPr>
+              <a:t>single device </a:t>
+            </a:r>
+            <a:r>
+              <a:rPr lang="en-US" sz="1800" dirty="0" smtClean="0">
+                <a:solidFill>
+                  <a:schemeClr val="accent4">
+                    <a:lumMod val="75000"/>
+                  </a:schemeClr>
+                </a:solidFill>
+              </a:rPr>
+              <a:t>can be </a:t>
+            </a:r>
+            <a:r>
+              <a:rPr lang="en-US" sz="1800" dirty="0" smtClean="0">
+                <a:solidFill>
+                  <a:schemeClr val="accent4">
+                    <a:lumMod val="75000"/>
+                  </a:schemeClr>
+                </a:solidFill>
+              </a:rPr>
+              <a:t>selected</a:t>
+            </a:r>
+          </a:p>
+          <a:p>
+            <a:endParaRPr lang="en-US" sz="1800" dirty="0">
+              <a:solidFill>
+                <a:schemeClr val="accent4">
+                  <a:lumMod val="75000"/>
+                </a:schemeClr>
+              </a:solidFill>
+            </a:endParaRPr>
+          </a:p>
+          <a:p>
+            <a:r>
+              <a:rPr lang="en-US" sz="1800" dirty="0" smtClean="0">
+                <a:solidFill>
+                  <a:schemeClr val="accent4">
+                    <a:lumMod val="75000"/>
+                  </a:schemeClr>
+                </a:solidFill>
+              </a:rPr>
+              <a:t>Here is screen shot of QT app</a:t>
+            </a:r>
+            <a:endParaRPr lang="en-US" sz="1800" dirty="0">
+              <a:solidFill>
+                <a:schemeClr val="accent4">
+                  <a:lumMod val="75000"/>
+                </a:schemeClr>
+              </a:solidFill>
+            </a:endParaRPr>
+          </a:p>
+          <a:p>
+            <a:endParaRPr lang="en" sz="1800" dirty="0">
               <a:solidFill>
                 <a:schemeClr val="accent4">
                   <a:lumMod val="75000"/>
@@ -9766,7 +10015,7 @@
       </p:sp>
       <p:pic>
         <p:nvPicPr>
-          <p:cNvPr id="2050" name="Picture 2"/>
+          <p:cNvPr id="1027" name="Picture 3"/>
           <p:cNvPicPr>
             <a:picLocks noChangeAspect="1" noChangeArrowheads="1"/>
           </p:cNvPicPr>
@@ -9787,8 +10036,8 @@
         </p:blipFill>
         <p:spPr bwMode="auto">
           <a:xfrm>
-            <a:off x="3657600" y="971550"/>
-            <a:ext cx="5262177" cy="3429000"/>
+            <a:off x="3810000" y="895350"/>
+            <a:ext cx="5181600" cy="4038600"/>
           </a:xfrm>
           <a:prstGeom prst="rect">
             <a:avLst/>

</xml_diff>

<commit_message>
Sun, Dec 17, 2017  1:49:27 PM
</commit_message>
<xml_diff>
--- a/ppt/CreateYourOwnApp.pptx
+++ b/ppt/CreateYourOwnApp.pptx
@@ -5645,11 +5645,7 @@
             </a:pPr>
             <a:r>
               <a:rPr lang="en" dirty="0" smtClean="0"/>
-              <a:t>Exlore Qt C++/WPF by creating your own </a:t>
-            </a:r>
-            <a:r>
-              <a:rPr lang="en" dirty="0" smtClean="0"/>
-              <a:t>App</a:t>
+              <a:t>Exlore Qt C++/WPF by creating your own App</a:t>
             </a:r>
           </a:p>
           <a:p>
@@ -10080,24 +10076,30 @@
               </a:rPr>
             </a:br>
             <a:r>
-              <a:rPr lang="en" sz="1400" dirty="0"/>
-              <a:t/>
+              <a:rPr lang="en-US" sz="2800" dirty="0" smtClean="0">
+                <a:hlinkClick r:id="rId3"/>
+              </a:rPr>
+              <a:t>https</a:t>
             </a:r>
-            <a:br>
-              <a:rPr lang="en" sz="1400" dirty="0"/>
-            </a:br>
             <a:r>
               <a:rPr lang="en-US" sz="2800" dirty="0">
                 <a:hlinkClick r:id="rId3"/>
               </a:rPr>
-              <a:t>https://</a:t>
+              <a:t>://</a:t>
             </a:r>
             <a:r>
               <a:rPr lang="en-US" sz="2800" dirty="0" smtClean="0">
                 <a:hlinkClick r:id="rId3"/>
               </a:rPr>
-              <a:t>download.qt.io/archive/qt/4.8/4.8.6/qt-opensource-windows-x86-mingw482-4.8.6-1.exe</a:t>
+              <a:t>download.qt.io/official_releases/qt/4.8/4.8.7/qt-opensource-windows-x86-mingw482-4.8.7.exe</a:t>
             </a:r>
+            <a:r>
+              <a:rPr lang="en-US" sz="2800" dirty="0" smtClean="0"/>
+              <a:t/>
+            </a:r>
+            <a:br>
+              <a:rPr lang="en-US" sz="2800" dirty="0" smtClean="0"/>
+            </a:br>
             <a:r>
               <a:rPr lang="en-US" sz="1400" dirty="0" smtClean="0"/>
               <a:t/>
@@ -10105,6 +10107,14 @@
             <a:br>
               <a:rPr lang="en-US" sz="1400" dirty="0" smtClean="0"/>
             </a:br>
+            <a:r>
+              <a:rPr lang="en-US" sz="1400" dirty="0" smtClean="0"/>
+              <a:t>(Please follow mingw32 </a:t>
+            </a:r>
+            <a:r>
+              <a:rPr lang="en-US" sz="1400" smtClean="0"/>
+              <a:t>compiler followed)</a:t>
+            </a:r>
             <a:r>
               <a:rPr lang="en-US" sz="1400" dirty="0" smtClean="0"/>
               <a:t/>

</xml_diff>